<commit_message>
Updated slides with minor fix
</commit_message>
<xml_diff>
--- a/Slides.pptx
+++ b/Slides.pptx
@@ -4,6 +4,9 @@
   <p:sldMasterIdLst>
     <p:sldMasterId id="2147483648" r:id="rId1"/>
   </p:sldMasterIdLst>
+  <p:notesMasterIdLst>
+    <p:notesMasterId r:id="rId8"/>
+  </p:notesMasterIdLst>
   <p:sldIdLst>
     <p:sldId id="256" r:id="rId2"/>
     <p:sldId id="261" r:id="rId3"/>
@@ -117,6 +120,356 @@
 </p:presentation>
 </file>
 
+<file path=ppt/notesMasters/notesMaster1.xml><?xml version="1.0" encoding="utf-8"?>
+<p:notesMaster xmlns:a="http://schemas.openxmlformats.org/drawingml/2006/main" xmlns:r="http://schemas.openxmlformats.org/officeDocument/2006/relationships" xmlns:p="http://schemas.openxmlformats.org/presentationml/2006/main">
+  <p:cSld>
+    <p:bg>
+      <p:bgRef idx="1001">
+        <a:schemeClr val="bg1"/>
+      </p:bgRef>
+    </p:bg>
+    <p:spTree>
+      <p:nvGrpSpPr>
+        <p:cNvPr id="1" name=""/>
+        <p:cNvGrpSpPr/>
+        <p:nvPr/>
+      </p:nvGrpSpPr>
+      <p:grpSpPr>
+        <a:xfrm>
+          <a:off x="0" y="0"/>
+          <a:ext cx="0" cy="0"/>
+          <a:chOff x="0" y="0"/>
+          <a:chExt cx="0" cy="0"/>
+        </a:xfrm>
+      </p:grpSpPr>
+      <p:sp>
+        <p:nvSpPr>
+          <p:cNvPr id="2" name="Header Placeholder 1"/>
+          <p:cNvSpPr>
+            <a:spLocks noGrp="1"/>
+          </p:cNvSpPr>
+          <p:nvPr>
+            <p:ph type="hdr" sz="quarter"/>
+          </p:nvPr>
+        </p:nvSpPr>
+        <p:spPr>
+          <a:xfrm>
+            <a:off x="0" y="0"/>
+            <a:ext cx="2971800" cy="458788"/>
+          </a:xfrm>
+          <a:prstGeom prst="rect">
+            <a:avLst/>
+          </a:prstGeom>
+        </p:spPr>
+        <p:txBody>
+          <a:bodyPr vert="horz" lIns="91440" tIns="45720" rIns="91440" bIns="45720" rtlCol="0"/>
+          <a:lstStyle>
+            <a:lvl1pPr algn="l">
+              <a:defRPr sz="1200"/>
+            </a:lvl1pPr>
+          </a:lstStyle>
+          <a:p>
+            <a:endParaRPr lang="en-US"/>
+          </a:p>
+        </p:txBody>
+      </p:sp>
+      <p:sp>
+        <p:nvSpPr>
+          <p:cNvPr id="3" name="Date Placeholder 2"/>
+          <p:cNvSpPr>
+            <a:spLocks noGrp="1"/>
+          </p:cNvSpPr>
+          <p:nvPr>
+            <p:ph type="dt" idx="1"/>
+          </p:nvPr>
+        </p:nvSpPr>
+        <p:spPr>
+          <a:xfrm>
+            <a:off x="3884613" y="0"/>
+            <a:ext cx="2971800" cy="458788"/>
+          </a:xfrm>
+          <a:prstGeom prst="rect">
+            <a:avLst/>
+          </a:prstGeom>
+        </p:spPr>
+        <p:txBody>
+          <a:bodyPr vert="horz" lIns="91440" tIns="45720" rIns="91440" bIns="45720" rtlCol="0"/>
+          <a:lstStyle>
+            <a:lvl1pPr algn="r">
+              <a:defRPr sz="1200"/>
+            </a:lvl1pPr>
+          </a:lstStyle>
+          <a:p>
+            <a:fld id="{079801F8-7BD6-534B-8423-99281A620A5A}" type="datetimeFigureOut">
+              <a:rPr lang="en-US" smtClean="0"/>
+              <a:t>9/28/16</a:t>
+            </a:fld>
+            <a:endParaRPr lang="en-US"/>
+          </a:p>
+        </p:txBody>
+      </p:sp>
+      <p:sp>
+        <p:nvSpPr>
+          <p:cNvPr id="4" name="Slide Image Placeholder 3"/>
+          <p:cNvSpPr>
+            <a:spLocks noGrp="1" noRot="1" noChangeAspect="1"/>
+          </p:cNvSpPr>
+          <p:nvPr>
+            <p:ph type="sldImg" idx="2"/>
+          </p:nvPr>
+        </p:nvSpPr>
+        <p:spPr>
+          <a:xfrm>
+            <a:off x="1371600" y="1143000"/>
+            <a:ext cx="4114800" cy="3086100"/>
+          </a:xfrm>
+          <a:prstGeom prst="rect">
+            <a:avLst/>
+          </a:prstGeom>
+          <a:noFill/>
+          <a:ln w="12700">
+            <a:solidFill>
+              <a:prstClr val="black"/>
+            </a:solidFill>
+          </a:ln>
+        </p:spPr>
+        <p:txBody>
+          <a:bodyPr vert="horz" lIns="91440" tIns="45720" rIns="91440" bIns="45720" rtlCol="0" anchor="ctr"/>
+          <a:lstStyle/>
+          <a:p>
+            <a:endParaRPr lang="en-US"/>
+          </a:p>
+        </p:txBody>
+      </p:sp>
+      <p:sp>
+        <p:nvSpPr>
+          <p:cNvPr id="5" name="Notes Placeholder 4"/>
+          <p:cNvSpPr>
+            <a:spLocks noGrp="1"/>
+          </p:cNvSpPr>
+          <p:nvPr>
+            <p:ph type="body" sz="quarter" idx="3"/>
+          </p:nvPr>
+        </p:nvSpPr>
+        <p:spPr>
+          <a:xfrm>
+            <a:off x="685800" y="4400550"/>
+            <a:ext cx="5486400" cy="3600450"/>
+          </a:xfrm>
+          <a:prstGeom prst="rect">
+            <a:avLst/>
+          </a:prstGeom>
+        </p:spPr>
+        <p:txBody>
+          <a:bodyPr vert="horz" lIns="91440" tIns="45720" rIns="91440" bIns="45720" rtlCol="0"/>
+          <a:lstStyle/>
+          <a:p>
+            <a:pPr lvl="0"/>
+            <a:r>
+              <a:rPr lang="en-US" smtClean="0"/>
+              <a:t>Click to edit Master text styles</a:t>
+            </a:r>
+          </a:p>
+          <a:p>
+            <a:pPr lvl="1"/>
+            <a:r>
+              <a:rPr lang="en-US" smtClean="0"/>
+              <a:t>Second level</a:t>
+            </a:r>
+          </a:p>
+          <a:p>
+            <a:pPr lvl="2"/>
+            <a:r>
+              <a:rPr lang="en-US" smtClean="0"/>
+              <a:t>Third level</a:t>
+            </a:r>
+          </a:p>
+          <a:p>
+            <a:pPr lvl="3"/>
+            <a:r>
+              <a:rPr lang="en-US" smtClean="0"/>
+              <a:t>Fourth level</a:t>
+            </a:r>
+          </a:p>
+          <a:p>
+            <a:pPr lvl="4"/>
+            <a:r>
+              <a:rPr lang="en-US" smtClean="0"/>
+              <a:t>Fifth level</a:t>
+            </a:r>
+            <a:endParaRPr lang="en-US"/>
+          </a:p>
+        </p:txBody>
+      </p:sp>
+      <p:sp>
+        <p:nvSpPr>
+          <p:cNvPr id="6" name="Footer Placeholder 5"/>
+          <p:cNvSpPr>
+            <a:spLocks noGrp="1"/>
+          </p:cNvSpPr>
+          <p:nvPr>
+            <p:ph type="ftr" sz="quarter" idx="4"/>
+          </p:nvPr>
+        </p:nvSpPr>
+        <p:spPr>
+          <a:xfrm>
+            <a:off x="0" y="8685213"/>
+            <a:ext cx="2971800" cy="458787"/>
+          </a:xfrm>
+          <a:prstGeom prst="rect">
+            <a:avLst/>
+          </a:prstGeom>
+        </p:spPr>
+        <p:txBody>
+          <a:bodyPr vert="horz" lIns="91440" tIns="45720" rIns="91440" bIns="45720" rtlCol="0" anchor="b"/>
+          <a:lstStyle>
+            <a:lvl1pPr algn="l">
+              <a:defRPr sz="1200"/>
+            </a:lvl1pPr>
+          </a:lstStyle>
+          <a:p>
+            <a:endParaRPr lang="en-US"/>
+          </a:p>
+        </p:txBody>
+      </p:sp>
+      <p:sp>
+        <p:nvSpPr>
+          <p:cNvPr id="7" name="Slide Number Placeholder 6"/>
+          <p:cNvSpPr>
+            <a:spLocks noGrp="1"/>
+          </p:cNvSpPr>
+          <p:nvPr>
+            <p:ph type="sldNum" sz="quarter" idx="5"/>
+          </p:nvPr>
+        </p:nvSpPr>
+        <p:spPr>
+          <a:xfrm>
+            <a:off x="3884613" y="8685213"/>
+            <a:ext cx="2971800" cy="458787"/>
+          </a:xfrm>
+          <a:prstGeom prst="rect">
+            <a:avLst/>
+          </a:prstGeom>
+        </p:spPr>
+        <p:txBody>
+          <a:bodyPr vert="horz" lIns="91440" tIns="45720" rIns="91440" bIns="45720" rtlCol="0" anchor="b"/>
+          <a:lstStyle>
+            <a:lvl1pPr algn="r">
+              <a:defRPr sz="1200"/>
+            </a:lvl1pPr>
+          </a:lstStyle>
+          <a:p>
+            <a:fld id="{58D59A37-D6AB-1646-A4C5-75920376FF06}" type="slidenum">
+              <a:rPr lang="en-US" smtClean="0"/>
+              <a:t>‹#›</a:t>
+            </a:fld>
+            <a:endParaRPr lang="en-US"/>
+          </a:p>
+        </p:txBody>
+      </p:sp>
+    </p:spTree>
+    <p:extLst>
+      <p:ext uri="{BB962C8B-B14F-4D97-AF65-F5344CB8AC3E}">
+        <p14:creationId xmlns:p14="http://schemas.microsoft.com/office/powerpoint/2010/main" val="2012380836"/>
+      </p:ext>
+    </p:extLst>
+  </p:cSld>
+  <p:clrMap bg1="lt1" tx1="dk1" bg2="lt2" tx2="dk2" accent1="accent1" accent2="accent2" accent3="accent3" accent4="accent4" accent5="accent5" accent6="accent6" hlink="hlink" folHlink="folHlink"/>
+  <p:notesStyle>
+    <a:lvl1pPr marL="0" algn="l" defTabSz="914400" rtl="0" eaLnBrk="1" latinLnBrk="0" hangingPunct="1">
+      <a:defRPr sz="1200" kern="1200">
+        <a:solidFill>
+          <a:schemeClr val="tx1"/>
+        </a:solidFill>
+        <a:latin typeface="+mn-lt"/>
+        <a:ea typeface="+mn-ea"/>
+        <a:cs typeface="+mn-cs"/>
+      </a:defRPr>
+    </a:lvl1pPr>
+    <a:lvl2pPr marL="457200" algn="l" defTabSz="914400" rtl="0" eaLnBrk="1" latinLnBrk="0" hangingPunct="1">
+      <a:defRPr sz="1200" kern="1200">
+        <a:solidFill>
+          <a:schemeClr val="tx1"/>
+        </a:solidFill>
+        <a:latin typeface="+mn-lt"/>
+        <a:ea typeface="+mn-ea"/>
+        <a:cs typeface="+mn-cs"/>
+      </a:defRPr>
+    </a:lvl2pPr>
+    <a:lvl3pPr marL="914400" algn="l" defTabSz="914400" rtl="0" eaLnBrk="1" latinLnBrk="0" hangingPunct="1">
+      <a:defRPr sz="1200" kern="1200">
+        <a:solidFill>
+          <a:schemeClr val="tx1"/>
+        </a:solidFill>
+        <a:latin typeface="+mn-lt"/>
+        <a:ea typeface="+mn-ea"/>
+        <a:cs typeface="+mn-cs"/>
+      </a:defRPr>
+    </a:lvl3pPr>
+    <a:lvl4pPr marL="1371600" algn="l" defTabSz="914400" rtl="0" eaLnBrk="1" latinLnBrk="0" hangingPunct="1">
+      <a:defRPr sz="1200" kern="1200">
+        <a:solidFill>
+          <a:schemeClr val="tx1"/>
+        </a:solidFill>
+        <a:latin typeface="+mn-lt"/>
+        <a:ea typeface="+mn-ea"/>
+        <a:cs typeface="+mn-cs"/>
+      </a:defRPr>
+    </a:lvl4pPr>
+    <a:lvl5pPr marL="1828800" algn="l" defTabSz="914400" rtl="0" eaLnBrk="1" latinLnBrk="0" hangingPunct="1">
+      <a:defRPr sz="1200" kern="1200">
+        <a:solidFill>
+          <a:schemeClr val="tx1"/>
+        </a:solidFill>
+        <a:latin typeface="+mn-lt"/>
+        <a:ea typeface="+mn-ea"/>
+        <a:cs typeface="+mn-cs"/>
+      </a:defRPr>
+    </a:lvl5pPr>
+    <a:lvl6pPr marL="2286000" algn="l" defTabSz="914400" rtl="0" eaLnBrk="1" latinLnBrk="0" hangingPunct="1">
+      <a:defRPr sz="1200" kern="1200">
+        <a:solidFill>
+          <a:schemeClr val="tx1"/>
+        </a:solidFill>
+        <a:latin typeface="+mn-lt"/>
+        <a:ea typeface="+mn-ea"/>
+        <a:cs typeface="+mn-cs"/>
+      </a:defRPr>
+    </a:lvl6pPr>
+    <a:lvl7pPr marL="2743200" algn="l" defTabSz="914400" rtl="0" eaLnBrk="1" latinLnBrk="0" hangingPunct="1">
+      <a:defRPr sz="1200" kern="1200">
+        <a:solidFill>
+          <a:schemeClr val="tx1"/>
+        </a:solidFill>
+        <a:latin typeface="+mn-lt"/>
+        <a:ea typeface="+mn-ea"/>
+        <a:cs typeface="+mn-cs"/>
+      </a:defRPr>
+    </a:lvl7pPr>
+    <a:lvl8pPr marL="3200400" algn="l" defTabSz="914400" rtl="0" eaLnBrk="1" latinLnBrk="0" hangingPunct="1">
+      <a:defRPr sz="1200" kern="1200">
+        <a:solidFill>
+          <a:schemeClr val="tx1"/>
+        </a:solidFill>
+        <a:latin typeface="+mn-lt"/>
+        <a:ea typeface="+mn-ea"/>
+        <a:cs typeface="+mn-cs"/>
+      </a:defRPr>
+    </a:lvl8pPr>
+    <a:lvl9pPr marL="3657600" algn="l" defTabSz="914400" rtl="0" eaLnBrk="1" latinLnBrk="0" hangingPunct="1">
+      <a:defRPr sz="1200" kern="1200">
+        <a:solidFill>
+          <a:schemeClr val="tx1"/>
+        </a:solidFill>
+        <a:latin typeface="+mn-lt"/>
+        <a:ea typeface="+mn-ea"/>
+        <a:cs typeface="+mn-cs"/>
+      </a:defRPr>
+    </a:lvl9pPr>
+  </p:notesStyle>
+</p:notesMaster>
+</file>
+
 <file path=ppt/slideLayouts/slideLayout1.xml><?xml version="1.0" encoding="utf-8"?>
 <p:sldLayout xmlns:a="http://schemas.openxmlformats.org/drawingml/2006/main" xmlns:r="http://schemas.openxmlformats.org/officeDocument/2006/relationships" xmlns:p="http://schemas.openxmlformats.org/presentationml/2006/main" preserve="1" userDrawn="1">
   <p:cSld name="Title Slide">
@@ -993,7 +1346,7 @@
       </p:grpSpPr>
       <p:sp>
         <p:nvSpPr>
-          <p:cNvPr id="15" name="Text Placeholder 14"/>
+          <p:cNvPr id="14" name="Text Placeholder 14"/>
           <p:cNvSpPr>
             <a:spLocks noGrp="1"/>
           </p:cNvSpPr>
@@ -1043,44 +1396,14 @@
       </p:sp>
       <p:pic>
         <p:nvPicPr>
-          <p:cNvPr id="4" name="Picture 3"/>
-          <p:cNvPicPr>
-            <a:picLocks noChangeAspect="1"/>
-          </p:cNvPicPr>
-          <p:nvPr userDrawn="1"/>
-        </p:nvPicPr>
-        <p:blipFill>
-          <a:blip r:embed="rId2" cstate="print">
-            <a:extLst>
-              <a:ext uri="{28A0092B-C50C-407E-A947-70E740481C1C}">
-                <a14:useLocalDpi xmlns:a14="http://schemas.microsoft.com/office/drawing/2010/main" val="0"/>
-              </a:ext>
-            </a:extLst>
-          </a:blip>
-          <a:stretch>
-            <a:fillRect/>
-          </a:stretch>
-        </p:blipFill>
-        <p:spPr>
-          <a:xfrm>
-            <a:off x="1299968" y="4262538"/>
-            <a:ext cx="263655" cy="285800"/>
-          </a:xfrm>
-          <a:prstGeom prst="rect">
-            <a:avLst/>
-          </a:prstGeom>
-        </p:spPr>
-      </p:pic>
-      <p:pic>
-        <p:nvPicPr>
-          <p:cNvPr id="3076" name="Picture 4" descr="http://www.iconsdb.com/icons/preview/white/email-12-xxl.png"/>
+          <p:cNvPr id="16" name="Picture 4" descr="http://www.iconsdb.com/icons/preview/white/email-12-xxl.png"/>
           <p:cNvPicPr>
             <a:picLocks noChangeAspect="1" noChangeArrowheads="1"/>
           </p:cNvPicPr>
           <p:nvPr userDrawn="1"/>
         </p:nvPicPr>
         <p:blipFill>
-          <a:blip r:embed="rId3" cstate="print">
+          <a:blip r:embed="rId2" cstate="print">
             <a:duotone>
               <a:prstClr val="black"/>
               <a:schemeClr val="accent5">
@@ -1101,8 +1424,8 @@
         </p:blipFill>
         <p:spPr bwMode="auto">
           <a:xfrm>
-            <a:off x="1299968" y="3544604"/>
-            <a:ext cx="263655" cy="351540"/>
+            <a:off x="1277427" y="3471406"/>
+            <a:ext cx="365760" cy="487684"/>
           </a:xfrm>
           <a:prstGeom prst="rect">
             <a:avLst/>
@@ -1121,14 +1444,14 @@
       </p:pic>
       <p:pic>
         <p:nvPicPr>
-          <p:cNvPr id="3078" name="Picture 6" descr="https://assets.toptal.io/uploads/blog/category/logo/77/web.png"/>
+          <p:cNvPr id="17" name="Picture 6" descr="https://assets.toptal.io/uploads/blog/category/logo/77/web.png"/>
           <p:cNvPicPr>
             <a:picLocks noChangeAspect="1" noChangeArrowheads="1"/>
           </p:cNvPicPr>
           <p:nvPr userDrawn="1"/>
         </p:nvPicPr>
         <p:blipFill>
-          <a:blip r:embed="rId4" cstate="print">
+          <a:blip r:embed="rId3" cstate="print">
             <a:extLst>
               <a:ext uri="{28A0092B-C50C-407E-A947-70E740481C1C}">
                 <a14:useLocalDpi xmlns:a14="http://schemas.microsoft.com/office/drawing/2010/main" val="0"/>
@@ -1142,8 +1465,8 @@
         </p:blipFill>
         <p:spPr bwMode="auto">
           <a:xfrm>
-            <a:off x="1307971" y="4930530"/>
-            <a:ext cx="247650" cy="330200"/>
+            <a:off x="1277426" y="4914390"/>
+            <a:ext cx="365760" cy="362482"/>
           </a:xfrm>
           <a:prstGeom prst="rect">
             <a:avLst/>
@@ -1162,7 +1485,7 @@
       </p:pic>
       <p:sp>
         <p:nvSpPr>
-          <p:cNvPr id="10" name="Text Placeholder 14"/>
+          <p:cNvPr id="18" name="Text Placeholder 14"/>
           <p:cNvSpPr>
             <a:spLocks noGrp="1"/>
           </p:cNvSpPr>
@@ -1212,7 +1535,7 @@
       </p:sp>
       <p:sp>
         <p:nvSpPr>
-          <p:cNvPr id="11" name="Text Placeholder 14"/>
+          <p:cNvPr id="19" name="Text Placeholder 14"/>
           <p:cNvSpPr>
             <a:spLocks noGrp="1"/>
           </p:cNvSpPr>
@@ -1262,7 +1585,7 @@
       </p:sp>
       <p:sp>
         <p:nvSpPr>
-          <p:cNvPr id="13" name="Text Placeholder 14"/>
+          <p:cNvPr id="20" name="Text Placeholder 14"/>
           <p:cNvSpPr>
             <a:spLocks noGrp="1"/>
           </p:cNvSpPr>
@@ -1312,7 +1635,7 @@
       </p:sp>
       <p:sp>
         <p:nvSpPr>
-          <p:cNvPr id="12" name="Title 1"/>
+          <p:cNvPr id="21" name="Title 1"/>
           <p:cNvSpPr>
             <a:spLocks noGrp="1"/>
           </p:cNvSpPr>
@@ -1342,6 +1665,30 @@
           </a:p>
         </p:txBody>
       </p:sp>
+      <p:pic>
+        <p:nvPicPr>
+          <p:cNvPr id="22" name="Picture 21"/>
+          <p:cNvPicPr>
+            <a:picLocks noChangeAspect="1"/>
+          </p:cNvPicPr>
+          <p:nvPr userDrawn="1"/>
+        </p:nvPicPr>
+        <p:blipFill>
+          <a:blip r:embed="rId4"/>
+          <a:stretch>
+            <a:fillRect/>
+          </a:stretch>
+        </p:blipFill>
+        <p:spPr>
+          <a:xfrm>
+            <a:off x="1277426" y="4261750"/>
+            <a:ext cx="365760" cy="298461"/>
+          </a:xfrm>
+          <a:prstGeom prst="rect">
+            <a:avLst/>
+          </a:prstGeom>
+        </p:spPr>
+      </p:pic>
     </p:spTree>
     <p:extLst>
       <p:ext uri="{BB962C8B-B14F-4D97-AF65-F5344CB8AC3E}">
@@ -1713,7 +2060,7 @@
         <a:buNone/>
         <a:defRPr sz="4400" kern="1200">
           <a:solidFill>
-            <a:schemeClr val="bg1"/>
+            <a:schemeClr val="bg2"/>
           </a:solidFill>
           <a:latin typeface="+mj-lt"/>
           <a:ea typeface="+mj-ea"/>
@@ -2922,14 +3269,22 @@
             <a:spLocks noGrp="1"/>
           </p:cNvSpPr>
           <p:nvPr>
-            <p:ph type="body" sz="quarter" idx="10"/>
-          </p:nvPr>
-        </p:nvSpPr>
-        <p:spPr/>
+            <p:ph type="body" sz="quarter" idx="4294967295"/>
+          </p:nvPr>
+        </p:nvSpPr>
+        <p:spPr>
+          <a:xfrm>
+            <a:off x="1838325" y="2750856"/>
+            <a:ext cx="6858000" cy="513843"/>
+          </a:xfrm>
+        </p:spPr>
         <p:txBody>
           <a:bodyPr/>
           <a:lstStyle/>
           <a:p>
+            <a:pPr marL="0" indent="0">
+              <a:buNone/>
+            </a:pPr>
             <a:r>
               <a:rPr lang="es-UY" dirty="0"/>
               <a:t>Nicolas Bello Camilletti</a:t>
@@ -2944,14 +3299,22 @@
             <a:spLocks noGrp="1"/>
           </p:cNvSpPr>
           <p:nvPr>
-            <p:ph type="body" sz="quarter" idx="11"/>
-          </p:nvPr>
-        </p:nvSpPr>
-        <p:spPr/>
+            <p:ph type="body" sz="quarter" idx="4294967295"/>
+          </p:nvPr>
+        </p:nvSpPr>
+        <p:spPr>
+          <a:xfrm>
+            <a:off x="1838325" y="3458326"/>
+            <a:ext cx="6162675" cy="513843"/>
+          </a:xfrm>
+        </p:spPr>
         <p:txBody>
           <a:bodyPr/>
           <a:lstStyle/>
           <a:p>
+            <a:pPr marL="0" indent="0">
+              <a:buNone/>
+            </a:pPr>
             <a:r>
               <a:rPr lang="es-UY" dirty="0"/>
               <a:t>nbellocamilletti@gmail.com</a:t>
@@ -2966,14 +3329,22 @@
             <a:spLocks noGrp="1"/>
           </p:cNvSpPr>
           <p:nvPr>
-            <p:ph type="body" sz="quarter" idx="12"/>
-          </p:nvPr>
-        </p:nvSpPr>
-        <p:spPr/>
+            <p:ph type="body" sz="quarter" idx="4294967295"/>
+          </p:nvPr>
+        </p:nvSpPr>
+        <p:spPr>
+          <a:xfrm>
+            <a:off x="1838325" y="4148518"/>
+            <a:ext cx="6162675" cy="513843"/>
+          </a:xfrm>
+        </p:spPr>
         <p:txBody>
           <a:bodyPr/>
           <a:lstStyle/>
           <a:p>
+            <a:pPr marL="0" indent="0">
+              <a:buNone/>
+            </a:pPr>
             <a:r>
               <a:rPr lang="es-UY" dirty="0" err="1"/>
               <a:t>nbellocam</a:t>
@@ -2989,14 +3360,22 @@
             <a:spLocks noGrp="1"/>
           </p:cNvSpPr>
           <p:nvPr>
-            <p:ph type="body" sz="quarter" idx="14"/>
-          </p:nvPr>
-        </p:nvSpPr>
-        <p:spPr/>
+            <p:ph type="body" sz="quarter" idx="4294967295"/>
+          </p:nvPr>
+        </p:nvSpPr>
+        <p:spPr>
+          <a:xfrm>
+            <a:off x="1838325" y="4838710"/>
+            <a:ext cx="6162675" cy="513843"/>
+          </a:xfrm>
+        </p:spPr>
         <p:txBody>
           <a:bodyPr/>
           <a:lstStyle/>
           <a:p>
+            <a:pPr marL="0" indent="0">
+              <a:buNone/>
+            </a:pPr>
             <a:r>
               <a:rPr lang="es-UY" dirty="0"/>
               <a:t>https://www.nbellocam.me/</a:t>
@@ -3014,7 +3393,12 @@
             <p:ph type="title"/>
           </p:nvPr>
         </p:nvSpPr>
-        <p:spPr/>
+        <p:spPr>
+          <a:xfrm>
+            <a:off x="628650" y="365126"/>
+            <a:ext cx="7886700" cy="1325563"/>
+          </a:xfrm>
+        </p:spPr>
         <p:txBody>
           <a:bodyPr/>
           <a:lstStyle/>
@@ -3245,4 +3629,265 @@
     </a:ext>
   </a:extLst>
 </a:theme>
+</file>
+
+<file path=ppt/theme/theme2.xml><?xml version="1.0" encoding="utf-8"?>
+<a:theme xmlns:a="http://schemas.openxmlformats.org/drawingml/2006/main" name="Office Theme">
+  <a:themeElements>
+    <a:clrScheme name="Office">
+      <a:dk1>
+        <a:sysClr val="windowText" lastClr="000000"/>
+      </a:dk1>
+      <a:lt1>
+        <a:sysClr val="window" lastClr="FFFFFF"/>
+      </a:lt1>
+      <a:dk2>
+        <a:srgbClr val="44546A"/>
+      </a:dk2>
+      <a:lt2>
+        <a:srgbClr val="E7E6E6"/>
+      </a:lt2>
+      <a:accent1>
+        <a:srgbClr val="5B9BD5"/>
+      </a:accent1>
+      <a:accent2>
+        <a:srgbClr val="ED7D31"/>
+      </a:accent2>
+      <a:accent3>
+        <a:srgbClr val="A5A5A5"/>
+      </a:accent3>
+      <a:accent4>
+        <a:srgbClr val="FFC000"/>
+      </a:accent4>
+      <a:accent5>
+        <a:srgbClr val="4472C4"/>
+      </a:accent5>
+      <a:accent6>
+        <a:srgbClr val="70AD47"/>
+      </a:accent6>
+      <a:hlink>
+        <a:srgbClr val="0563C1"/>
+      </a:hlink>
+      <a:folHlink>
+        <a:srgbClr val="954F72"/>
+      </a:folHlink>
+    </a:clrScheme>
+    <a:fontScheme name="Office">
+      <a:majorFont>
+        <a:latin typeface="Calibri Light" panose="020F0302020204030204"/>
+        <a:ea typeface=""/>
+        <a:cs typeface=""/>
+        <a:font script="Jpan" typeface="Yu Gothic Light"/>
+        <a:font script="Hang" typeface="맑은 고딕"/>
+        <a:font script="Hans" typeface="DengXian Light"/>
+        <a:font script="Hant" typeface="新細明體"/>
+        <a:font script="Arab" typeface="Times New Roman"/>
+        <a:font script="Hebr" typeface="Times New Roman"/>
+        <a:font script="Thai" typeface="Angsana New"/>
+        <a:font script="Ethi" typeface="Nyala"/>
+        <a:font script="Beng" typeface="Vrinda"/>
+        <a:font script="Gujr" typeface="Shruti"/>
+        <a:font script="Khmr" typeface="MoolBoran"/>
+        <a:font script="Knda" typeface="Tunga"/>
+        <a:font script="Guru" typeface="Raavi"/>
+        <a:font script="Cans" typeface="Euphemia"/>
+        <a:font script="Cher" typeface="Plantagenet Cherokee"/>
+        <a:font script="Yiii" typeface="Microsoft Yi Baiti"/>
+        <a:font script="Tibt" typeface="Microsoft Himalaya"/>
+        <a:font script="Thaa" typeface="MV Boli"/>
+        <a:font script="Deva" typeface="Mangal"/>
+        <a:font script="Telu" typeface="Gautami"/>
+        <a:font script="Taml" typeface="Latha"/>
+        <a:font script="Syrc" typeface="Estrangelo Edessa"/>
+        <a:font script="Orya" typeface="Kalinga"/>
+        <a:font script="Mlym" typeface="Kartika"/>
+        <a:font script="Laoo" typeface="DokChampa"/>
+        <a:font script="Sinh" typeface="Iskoola Pota"/>
+        <a:font script="Mong" typeface="Mongolian Baiti"/>
+        <a:font script="Viet" typeface="Times New Roman"/>
+        <a:font script="Uigh" typeface="Microsoft Uighur"/>
+        <a:font script="Geor" typeface="Sylfaen"/>
+      </a:majorFont>
+      <a:minorFont>
+        <a:latin typeface="Calibri" panose="020F0502020204030204"/>
+        <a:ea typeface=""/>
+        <a:cs typeface=""/>
+        <a:font script="Jpan" typeface="Yu Gothic"/>
+        <a:font script="Hang" typeface="맑은 고딕"/>
+        <a:font script="Hans" typeface="DengXian"/>
+        <a:font script="Hant" typeface="新細明體"/>
+        <a:font script="Arab" typeface="Arial"/>
+        <a:font script="Hebr" typeface="Arial"/>
+        <a:font script="Thai" typeface="Cordia New"/>
+        <a:font script="Ethi" typeface="Nyala"/>
+        <a:font script="Beng" typeface="Vrinda"/>
+        <a:font script="Gujr" typeface="Shruti"/>
+        <a:font script="Khmr" typeface="DaunPenh"/>
+        <a:font script="Knda" typeface="Tunga"/>
+        <a:font script="Guru" typeface="Raavi"/>
+        <a:font script="Cans" typeface="Euphemia"/>
+        <a:font script="Cher" typeface="Plantagenet Cherokee"/>
+        <a:font script="Yiii" typeface="Microsoft Yi Baiti"/>
+        <a:font script="Tibt" typeface="Microsoft Himalaya"/>
+        <a:font script="Thaa" typeface="MV Boli"/>
+        <a:font script="Deva" typeface="Mangal"/>
+        <a:font script="Telu" typeface="Gautami"/>
+        <a:font script="Taml" typeface="Latha"/>
+        <a:font script="Syrc" typeface="Estrangelo Edessa"/>
+        <a:font script="Orya" typeface="Kalinga"/>
+        <a:font script="Mlym" typeface="Kartika"/>
+        <a:font script="Laoo" typeface="DokChampa"/>
+        <a:font script="Sinh" typeface="Iskoola Pota"/>
+        <a:font script="Mong" typeface="Mongolian Baiti"/>
+        <a:font script="Viet" typeface="Arial"/>
+        <a:font script="Uigh" typeface="Microsoft Uighur"/>
+        <a:font script="Geor" typeface="Sylfaen"/>
+      </a:minorFont>
+    </a:fontScheme>
+    <a:fmtScheme name="Office">
+      <a:fillStyleLst>
+        <a:solidFill>
+          <a:schemeClr val="phClr"/>
+        </a:solidFill>
+        <a:gradFill rotWithShape="1">
+          <a:gsLst>
+            <a:gs pos="0">
+              <a:schemeClr val="phClr">
+                <a:lumMod val="110000"/>
+                <a:satMod val="105000"/>
+                <a:tint val="67000"/>
+              </a:schemeClr>
+            </a:gs>
+            <a:gs pos="50000">
+              <a:schemeClr val="phClr">
+                <a:lumMod val="105000"/>
+                <a:satMod val="103000"/>
+                <a:tint val="73000"/>
+              </a:schemeClr>
+            </a:gs>
+            <a:gs pos="100000">
+              <a:schemeClr val="phClr">
+                <a:lumMod val="105000"/>
+                <a:satMod val="109000"/>
+                <a:tint val="81000"/>
+              </a:schemeClr>
+            </a:gs>
+          </a:gsLst>
+          <a:lin ang="5400000" scaled="0"/>
+        </a:gradFill>
+        <a:gradFill rotWithShape="1">
+          <a:gsLst>
+            <a:gs pos="0">
+              <a:schemeClr val="phClr">
+                <a:satMod val="103000"/>
+                <a:lumMod val="102000"/>
+                <a:tint val="94000"/>
+              </a:schemeClr>
+            </a:gs>
+            <a:gs pos="50000">
+              <a:schemeClr val="phClr">
+                <a:satMod val="110000"/>
+                <a:lumMod val="100000"/>
+                <a:shade val="100000"/>
+              </a:schemeClr>
+            </a:gs>
+            <a:gs pos="100000">
+              <a:schemeClr val="phClr">
+                <a:lumMod val="99000"/>
+                <a:satMod val="120000"/>
+                <a:shade val="78000"/>
+              </a:schemeClr>
+            </a:gs>
+          </a:gsLst>
+          <a:lin ang="5400000" scaled="0"/>
+        </a:gradFill>
+      </a:fillStyleLst>
+      <a:lnStyleLst>
+        <a:ln w="6350" cap="flat" cmpd="sng" algn="ctr">
+          <a:solidFill>
+            <a:schemeClr val="phClr"/>
+          </a:solidFill>
+          <a:prstDash val="solid"/>
+          <a:miter lim="800000"/>
+        </a:ln>
+        <a:ln w="12700" cap="flat" cmpd="sng" algn="ctr">
+          <a:solidFill>
+            <a:schemeClr val="phClr"/>
+          </a:solidFill>
+          <a:prstDash val="solid"/>
+          <a:miter lim="800000"/>
+        </a:ln>
+        <a:ln w="19050" cap="flat" cmpd="sng" algn="ctr">
+          <a:solidFill>
+            <a:schemeClr val="phClr"/>
+          </a:solidFill>
+          <a:prstDash val="solid"/>
+          <a:miter lim="800000"/>
+        </a:ln>
+      </a:lnStyleLst>
+      <a:effectStyleLst>
+        <a:effectStyle>
+          <a:effectLst/>
+        </a:effectStyle>
+        <a:effectStyle>
+          <a:effectLst/>
+        </a:effectStyle>
+        <a:effectStyle>
+          <a:effectLst>
+            <a:outerShdw blurRad="57150" dist="19050" dir="5400000" algn="ctr" rotWithShape="0">
+              <a:srgbClr val="000000">
+                <a:alpha val="63000"/>
+              </a:srgbClr>
+            </a:outerShdw>
+          </a:effectLst>
+        </a:effectStyle>
+      </a:effectStyleLst>
+      <a:bgFillStyleLst>
+        <a:solidFill>
+          <a:schemeClr val="phClr"/>
+        </a:solidFill>
+        <a:solidFill>
+          <a:schemeClr val="phClr">
+            <a:tint val="95000"/>
+            <a:satMod val="170000"/>
+          </a:schemeClr>
+        </a:solidFill>
+        <a:gradFill rotWithShape="1">
+          <a:gsLst>
+            <a:gs pos="0">
+              <a:schemeClr val="phClr">
+                <a:tint val="93000"/>
+                <a:satMod val="150000"/>
+                <a:shade val="98000"/>
+                <a:lumMod val="102000"/>
+              </a:schemeClr>
+            </a:gs>
+            <a:gs pos="50000">
+              <a:schemeClr val="phClr">
+                <a:tint val="98000"/>
+                <a:satMod val="130000"/>
+                <a:shade val="90000"/>
+                <a:lumMod val="103000"/>
+              </a:schemeClr>
+            </a:gs>
+            <a:gs pos="100000">
+              <a:schemeClr val="phClr">
+                <a:shade val="63000"/>
+                <a:satMod val="120000"/>
+              </a:schemeClr>
+            </a:gs>
+          </a:gsLst>
+          <a:lin ang="5400000" scaled="0"/>
+        </a:gradFill>
+      </a:bgFillStyleLst>
+    </a:fmtScheme>
+  </a:themeElements>
+  <a:objectDefaults/>
+  <a:extraClrSchemeLst/>
+  <a:extLst>
+    <a:ext uri="{05A4C25C-085E-4340-85A3-A5531E510DB2}">
+      <thm15:themeFamily xmlns:thm15="http://schemas.microsoft.com/office/thememl/2012/main" name="Office Theme" id="{62F939B6-93AF-4DB8-9C6B-D6C7DFDC589F}" vid="{4A3C46E8-61CC-4603-A589-7422A47A8E4A}"/>
+    </a:ext>
+  </a:extLst>
+</a:theme>
 </file>
</xml_diff>

<commit_message>
Minor update in slides
</commit_message>
<xml_diff>
--- a/Slides.pptx
+++ b/Slides.pptx
@@ -6,7 +6,7 @@
     <p:sldMasterId id="2147483685" r:id="rId2"/>
   </p:sldMasterIdLst>
   <p:notesMasterIdLst>
-    <p:notesMasterId r:id="rId25"/>
+    <p:notesMasterId r:id="rId27"/>
   </p:notesMasterIdLst>
   <p:sldIdLst>
     <p:sldId id="257" r:id="rId3"/>
@@ -29,8 +29,10 @@
     <p:sldId id="273" r:id="rId20"/>
     <p:sldId id="283" r:id="rId21"/>
     <p:sldId id="271" r:id="rId22"/>
-    <p:sldId id="270" r:id="rId23"/>
-    <p:sldId id="272" r:id="rId24"/>
+    <p:sldId id="285" r:id="rId23"/>
+    <p:sldId id="270" r:id="rId24"/>
+    <p:sldId id="272" r:id="rId25"/>
+    <p:sldId id="286" r:id="rId26"/>
   </p:sldIdLst>
   <p:sldSz cx="12192000" cy="6858000"/>
   <p:notesSz cx="6858000" cy="9144000"/>
@@ -154,8 +156,10 @@
             <p14:sldId id="273"/>
             <p14:sldId id="283"/>
             <p14:sldId id="271"/>
+            <p14:sldId id="285"/>
             <p14:sldId id="270"/>
             <p14:sldId id="272"/>
+            <p14:sldId id="286"/>
           </p14:sldIdLst>
         </p14:section>
       </p14:sectionLst>
@@ -249,7 +253,7 @@
           <a:p>
             <a:fld id="{C2022EBD-2366-2648-909D-9CF649D3F1A5}" type="datetimeFigureOut">
               <a:rPr lang="en-US" smtClean="0"/>
-              <a:t>10/17/16</a:t>
+              <a:t>10/21/16</a:t>
             </a:fld>
             <a:endParaRPr lang="en-US"/>
           </a:p>
@@ -782,7 +786,7 @@
           <a:p>
             <a:fld id="{9897C70F-3162-1F43-ACD3-CB705D18D7A1}" type="slidenum">
               <a:rPr lang="en-US" smtClean="0"/>
-              <a:t>21</a:t>
+              <a:t>22</a:t>
             </a:fld>
             <a:endParaRPr lang="en-US"/>
           </a:p>
@@ -866,7 +870,7 @@
           <a:p>
             <a:fld id="{9897C70F-3162-1F43-ACD3-CB705D18D7A1}" type="slidenum">
               <a:rPr lang="en-US" smtClean="0"/>
-              <a:t>22</a:t>
+              <a:t>23</a:t>
             </a:fld>
             <a:endParaRPr lang="en-US"/>
           </a:p>
@@ -876,6 +880,90 @@
     <p:extLst>
       <p:ext uri="{BB962C8B-B14F-4D97-AF65-F5344CB8AC3E}">
         <p14:creationId xmlns:p14="http://schemas.microsoft.com/office/powerpoint/2010/main" val="1901377843"/>
+      </p:ext>
+    </p:extLst>
+  </p:cSld>
+  <p:clrMapOvr>
+    <a:masterClrMapping/>
+  </p:clrMapOvr>
+</p:notes>
+</file>
+
+<file path=ppt/notesSlides/notesSlide5.xml><?xml version="1.0" encoding="utf-8"?>
+<p:notes xmlns:a="http://schemas.openxmlformats.org/drawingml/2006/main" xmlns:r="http://schemas.openxmlformats.org/officeDocument/2006/relationships" xmlns:p="http://schemas.openxmlformats.org/presentationml/2006/main">
+  <p:cSld>
+    <p:spTree>
+      <p:nvGrpSpPr>
+        <p:cNvPr id="1" name=""/>
+        <p:cNvGrpSpPr/>
+        <p:nvPr/>
+      </p:nvGrpSpPr>
+      <p:grpSpPr>
+        <a:xfrm>
+          <a:off x="0" y="0"/>
+          <a:ext cx="0" cy="0"/>
+          <a:chOff x="0" y="0"/>
+          <a:chExt cx="0" cy="0"/>
+        </a:xfrm>
+      </p:grpSpPr>
+      <p:sp>
+        <p:nvSpPr>
+          <p:cNvPr id="2" name="Slide Image Placeholder 1"/>
+          <p:cNvSpPr>
+            <a:spLocks noGrp="1" noRot="1" noChangeAspect="1"/>
+          </p:cNvSpPr>
+          <p:nvPr>
+            <p:ph type="sldImg"/>
+          </p:nvPr>
+        </p:nvSpPr>
+        <p:spPr/>
+      </p:sp>
+      <p:sp>
+        <p:nvSpPr>
+          <p:cNvPr id="3" name="Notes Placeholder 2"/>
+          <p:cNvSpPr>
+            <a:spLocks noGrp="1"/>
+          </p:cNvSpPr>
+          <p:nvPr>
+            <p:ph type="body" idx="1"/>
+          </p:nvPr>
+        </p:nvSpPr>
+        <p:spPr/>
+        <p:txBody>
+          <a:bodyPr/>
+          <a:lstStyle/>
+          <a:p>
+            <a:endParaRPr lang="en-US"/>
+          </a:p>
+        </p:txBody>
+      </p:sp>
+      <p:sp>
+        <p:nvSpPr>
+          <p:cNvPr id="4" name="Slide Number Placeholder 3"/>
+          <p:cNvSpPr>
+            <a:spLocks noGrp="1"/>
+          </p:cNvSpPr>
+          <p:nvPr>
+            <p:ph type="sldNum" sz="quarter" idx="10"/>
+          </p:nvPr>
+        </p:nvSpPr>
+        <p:spPr/>
+        <p:txBody>
+          <a:bodyPr/>
+          <a:lstStyle/>
+          <a:p>
+            <a:fld id="{9897C70F-3162-1F43-ACD3-CB705D18D7A1}" type="slidenum">
+              <a:rPr lang="en-US" smtClean="0"/>
+              <a:t>24</a:t>
+            </a:fld>
+            <a:endParaRPr lang="en-US"/>
+          </a:p>
+        </p:txBody>
+      </p:sp>
+    </p:spTree>
+    <p:extLst>
+      <p:ext uri="{BB962C8B-B14F-4D97-AF65-F5344CB8AC3E}">
+        <p14:creationId xmlns:p14="http://schemas.microsoft.com/office/powerpoint/2010/main" val="331134960"/>
       </p:ext>
     </p:extLst>
   </p:cSld>
@@ -3070,7 +3158,7 @@
           <a:p>
             <a:fld id="{E81B1AFF-ADD2-D84C-9164-1B9086137015}" type="datetimeFigureOut">
               <a:rPr lang="en-US" smtClean="0"/>
-              <a:t>10/17/16</a:t>
+              <a:t>10/21/16</a:t>
             </a:fld>
             <a:endParaRPr lang="en-US"/>
           </a:p>
@@ -12126,7 +12214,6 @@
               <a:rPr lang="en-US" dirty="0"/>
               <a:t>a ASP.NET Core con Angular 2</a:t>
             </a:r>
-            <a:endParaRPr lang="en-US" dirty="0"/>
           </a:p>
         </p:txBody>
       </p:sp>
@@ -21518,6 +21605,173 @@
       </p:grpSpPr>
       <p:sp>
         <p:nvSpPr>
+          <p:cNvPr id="2" name="Text Placeholder 1"/>
+          <p:cNvSpPr>
+            <a:spLocks noGrp="1"/>
+          </p:cNvSpPr>
+          <p:nvPr>
+            <p:ph type="body" sz="quarter" idx="10"/>
+          </p:nvPr>
+        </p:nvSpPr>
+        <p:spPr>
+          <a:xfrm>
+            <a:off x="269239" y="1189177"/>
+            <a:ext cx="11653523" cy="5099153"/>
+          </a:xfrm>
+        </p:spPr>
+        <p:txBody>
+          <a:bodyPr/>
+          <a:lstStyle/>
+          <a:p>
+            <a:pPr marL="514350" indent="-514350">
+              <a:lnSpc>
+                <a:spcPct val="150000"/>
+              </a:lnSpc>
+              <a:buFont typeface="+mj-lt"/>
+              <a:buAutoNum type="arabicPeriod"/>
+            </a:pPr>
+            <a:r>
+              <a:rPr lang="es-ES" dirty="0"/>
+              <a:t>Configurando el ambiente</a:t>
+            </a:r>
+          </a:p>
+          <a:p>
+            <a:pPr marL="514350" indent="-514350">
+              <a:lnSpc>
+                <a:spcPct val="150000"/>
+              </a:lnSpc>
+              <a:buFont typeface="+mj-lt"/>
+              <a:buAutoNum type="arabicPeriod"/>
+            </a:pPr>
+            <a:r>
+              <a:rPr lang="es-ES" dirty="0"/>
+              <a:t>Creando una app de Angular 2 con </a:t>
+            </a:r>
+            <a:r>
+              <a:rPr lang="es-ES" dirty="0" err="1"/>
+              <a:t>Webpack</a:t>
+            </a:r>
+            <a:endParaRPr lang="es-ES" dirty="0"/>
+          </a:p>
+          <a:p>
+            <a:pPr marL="514350" indent="-514350">
+              <a:lnSpc>
+                <a:spcPct val="150000"/>
+              </a:lnSpc>
+              <a:buFont typeface="+mj-lt"/>
+              <a:buAutoNum type="arabicPeriod"/>
+            </a:pPr>
+            <a:r>
+              <a:rPr lang="es-ES" dirty="0"/>
+              <a:t>Creando una API REST con ASP.NET Core</a:t>
+            </a:r>
+          </a:p>
+          <a:p>
+            <a:pPr marL="514350" indent="-514350">
+              <a:lnSpc>
+                <a:spcPct val="150000"/>
+              </a:lnSpc>
+              <a:buFont typeface="+mj-lt"/>
+              <a:buAutoNum type="arabicPeriod"/>
+            </a:pPr>
+            <a:r>
+              <a:rPr lang="es-ES" dirty="0"/>
+              <a:t>Integrando Angular 2 con ASP.NET Core</a:t>
+            </a:r>
+          </a:p>
+          <a:p>
+            <a:pPr marL="514350" indent="-514350">
+              <a:lnSpc>
+                <a:spcPct val="150000"/>
+              </a:lnSpc>
+              <a:buFont typeface="+mj-lt"/>
+              <a:buAutoNum type="arabicPeriod"/>
+            </a:pPr>
+            <a:r>
+              <a:rPr lang="es-ES" dirty="0"/>
+              <a:t>Introducción a </a:t>
+            </a:r>
+            <a:r>
+              <a:rPr lang="es-ES" dirty="0" err="1"/>
+              <a:t>Javascript</a:t>
+            </a:r>
+            <a:r>
+              <a:rPr lang="es-ES" dirty="0"/>
+              <a:t> </a:t>
+            </a:r>
+            <a:r>
+              <a:rPr lang="es-ES" dirty="0" err="1" smtClean="0"/>
+              <a:t>Services</a:t>
+            </a:r>
+            <a:endParaRPr lang="en-US" dirty="0"/>
+          </a:p>
+        </p:txBody>
+      </p:sp>
+      <p:sp>
+        <p:nvSpPr>
+          <p:cNvPr id="3" name="Title 2"/>
+          <p:cNvSpPr>
+            <a:spLocks noGrp="1"/>
+          </p:cNvSpPr>
+          <p:nvPr>
+            <p:ph type="title"/>
+          </p:nvPr>
+        </p:nvSpPr>
+        <p:spPr/>
+        <p:txBody>
+          <a:bodyPr/>
+          <a:lstStyle/>
+          <a:p>
+            <a:r>
+              <a:rPr lang="en-US" dirty="0" err="1"/>
+              <a:t>Módulos</a:t>
+            </a:r>
+            <a:endParaRPr lang="en-US" dirty="0"/>
+          </a:p>
+        </p:txBody>
+      </p:sp>
+    </p:spTree>
+    <p:extLst>
+      <p:ext uri="{BB962C8B-B14F-4D97-AF65-F5344CB8AC3E}">
+        <p14:creationId xmlns:p14="http://schemas.microsoft.com/office/powerpoint/2010/main" val="1763210581"/>
+      </p:ext>
+    </p:extLst>
+  </p:cSld>
+  <p:clrMapOvr>
+    <a:masterClrMapping/>
+  </p:clrMapOvr>
+  <p:transition>
+    <p:fade/>
+  </p:transition>
+  <p:timing>
+    <p:tnLst>
+      <p:par>
+        <p:cTn id="1" dur="indefinite" restart="never" nodeType="tmRoot"/>
+      </p:par>
+    </p:tnLst>
+  </p:timing>
+</p:sld>
+</file>
+
+<file path=ppt/slides/slide22.xml><?xml version="1.0" encoding="utf-8"?>
+<p:sld xmlns:a="http://schemas.openxmlformats.org/drawingml/2006/main" xmlns:r="http://schemas.openxmlformats.org/officeDocument/2006/relationships" xmlns:p="http://schemas.openxmlformats.org/presentationml/2006/main">
+  <p:cSld>
+    <p:spTree>
+      <p:nvGrpSpPr>
+        <p:cNvPr id="1" name=""/>
+        <p:cNvGrpSpPr/>
+        <p:nvPr/>
+      </p:nvGrpSpPr>
+      <p:grpSpPr>
+        <a:xfrm>
+          <a:off x="0" y="0"/>
+          <a:ext cx="0" cy="0"/>
+          <a:chOff x="0" y="0"/>
+          <a:chExt cx="0" cy="0"/>
+        </a:xfrm>
+      </p:grpSpPr>
+      <p:sp>
+        <p:nvSpPr>
           <p:cNvPr id="4" name="Title 3"/>
           <p:cNvSpPr>
             <a:spLocks noGrp="1"/>
@@ -21601,7 +21855,7 @@
 </p:sld>
 </file>
 
-<file path=ppt/slides/slide22.xml><?xml version="1.0" encoding="utf-8"?>
+<file path=ppt/slides/slide23.xml><?xml version="1.0" encoding="utf-8"?>
 <p:sld xmlns:a="http://schemas.openxmlformats.org/drawingml/2006/main" xmlns:r="http://schemas.openxmlformats.org/officeDocument/2006/relationships" xmlns:p="http://schemas.openxmlformats.org/presentationml/2006/main">
   <p:cSld>
     <p:spTree>
@@ -21712,6 +21966,108 @@
     <p:extLst>
       <p:ext uri="{BB962C8B-B14F-4D97-AF65-F5344CB8AC3E}">
         <p14:creationId xmlns:p14="http://schemas.microsoft.com/office/powerpoint/2010/main" val="177973381"/>
+      </p:ext>
+    </p:extLst>
+  </p:cSld>
+  <p:clrMapOvr>
+    <a:masterClrMapping/>
+  </p:clrMapOvr>
+  <p:timing>
+    <p:tnLst>
+      <p:par>
+        <p:cTn id="1" dur="indefinite" restart="never" nodeType="tmRoot"/>
+      </p:par>
+    </p:tnLst>
+  </p:timing>
+</p:sld>
+</file>
+
+<file path=ppt/slides/slide24.xml><?xml version="1.0" encoding="utf-8"?>
+<p:sld xmlns:a="http://schemas.openxmlformats.org/drawingml/2006/main" xmlns:r="http://schemas.openxmlformats.org/officeDocument/2006/relationships" xmlns:p="http://schemas.openxmlformats.org/presentationml/2006/main">
+  <p:cSld>
+    <p:spTree>
+      <p:nvGrpSpPr>
+        <p:cNvPr id="1" name=""/>
+        <p:cNvGrpSpPr/>
+        <p:nvPr/>
+      </p:nvGrpSpPr>
+      <p:grpSpPr>
+        <a:xfrm>
+          <a:off x="0" y="0"/>
+          <a:ext cx="0" cy="0"/>
+          <a:chOff x="0" y="0"/>
+          <a:chExt cx="0" cy="0"/>
+        </a:xfrm>
+      </p:grpSpPr>
+      <p:sp>
+        <p:nvSpPr>
+          <p:cNvPr id="4" name="Title 3"/>
+          <p:cNvSpPr>
+            <a:spLocks noGrp="1"/>
+          </p:cNvSpPr>
+          <p:nvPr>
+            <p:ph type="title"/>
+          </p:nvPr>
+        </p:nvSpPr>
+        <p:spPr/>
+        <p:txBody>
+          <a:bodyPr>
+            <a:normAutofit/>
+          </a:bodyPr>
+          <a:lstStyle/>
+          <a:p>
+            <a:r>
+              <a:rPr lang="en-US" sz="7200" dirty="0" err="1" smtClean="0"/>
+              <a:t>Arrancamos</a:t>
+            </a:r>
+            <a:r>
+              <a:rPr lang="en-US" sz="7200" dirty="0" smtClean="0"/>
+              <a:t>!</a:t>
+            </a:r>
+            <a:endParaRPr lang="en-US" sz="7200" dirty="0"/>
+          </a:p>
+        </p:txBody>
+      </p:sp>
+      <p:sp>
+        <p:nvSpPr>
+          <p:cNvPr id="6" name="Text Placeholder 5"/>
+          <p:cNvSpPr>
+            <a:spLocks noGrp="1"/>
+          </p:cNvSpPr>
+          <p:nvPr>
+            <p:ph type="body" idx="1"/>
+          </p:nvPr>
+        </p:nvSpPr>
+        <p:spPr>
+          <a:xfrm>
+            <a:off x="831850" y="4589463"/>
+            <a:ext cx="10515600" cy="683264"/>
+          </a:xfrm>
+        </p:spPr>
+        <p:txBody>
+          <a:bodyPr/>
+          <a:lstStyle/>
+          <a:p>
+            <a:r>
+              <a:rPr lang="en-US" sz="3600" dirty="0"/>
+              <a:t>GitHub: </a:t>
+            </a:r>
+            <a:r>
+              <a:rPr lang="en-US" sz="3600" dirty="0" err="1" smtClean="0"/>
+              <a:t>nbellocam</a:t>
+            </a:r>
+            <a:r>
+              <a:rPr lang="en-US" sz="3600" dirty="0" smtClean="0"/>
+              <a:t>/asp-net-core-angular-workshop</a:t>
+            </a:r>
+            <a:endParaRPr lang="en-US" sz="3600" dirty="0"/>
+          </a:p>
+        </p:txBody>
+      </p:sp>
+    </p:spTree>
+    <p:extLst>
+      <p:ext uri="{BB962C8B-B14F-4D97-AF65-F5344CB8AC3E}">
+        <p14:creationId xmlns:p14="http://schemas.microsoft.com/office/powerpoint/2010/main" val="1836886776"/>
       </p:ext>
     </p:extLst>
   </p:cSld>

</xml_diff>